<commit_message>
updated some tables, made a prettier FIFO trend figure
</commit_message>
<xml_diff>
--- a/figures/figure_farm_design_schematic.pptx
+++ b/figures/figure_farm_design_schematic.pptx
@@ -197,7 +197,7 @@
           <a:p>
             <a:fld id="{BA944259-FE82-A246-B0CF-B93C8EE208BE}" type="datetimeFigureOut">
               <a:rPr lang="en-US" smtClean="0"/>
-              <a:t>12/13/19</a:t>
+              <a:t>2/6/20</a:t>
             </a:fld>
             <a:endParaRPr lang="en-US"/>
           </a:p>
@@ -710,7 +710,7 @@
           <a:p>
             <a:fld id="{C8F573ED-087B-AA4D-9B10-6AC522CA2519}" type="datetimeFigureOut">
               <a:rPr lang="en-US" smtClean="0"/>
-              <a:t>12/13/19</a:t>
+              <a:t>2/6/20</a:t>
             </a:fld>
             <a:endParaRPr lang="en-US"/>
           </a:p>
@@ -908,7 +908,7 @@
           <a:p>
             <a:fld id="{C8F573ED-087B-AA4D-9B10-6AC522CA2519}" type="datetimeFigureOut">
               <a:rPr lang="en-US" smtClean="0"/>
-              <a:t>12/13/19</a:t>
+              <a:t>2/6/20</a:t>
             </a:fld>
             <a:endParaRPr lang="en-US"/>
           </a:p>
@@ -1116,7 +1116,7 @@
           <a:p>
             <a:fld id="{C8F573ED-087B-AA4D-9B10-6AC522CA2519}" type="datetimeFigureOut">
               <a:rPr lang="en-US" smtClean="0"/>
-              <a:t>12/13/19</a:t>
+              <a:t>2/6/20</a:t>
             </a:fld>
             <a:endParaRPr lang="en-US"/>
           </a:p>
@@ -1314,7 +1314,7 @@
           <a:p>
             <a:fld id="{C8F573ED-087B-AA4D-9B10-6AC522CA2519}" type="datetimeFigureOut">
               <a:rPr lang="en-US" smtClean="0"/>
-              <a:t>12/13/19</a:t>
+              <a:t>2/6/20</a:t>
             </a:fld>
             <a:endParaRPr lang="en-US"/>
           </a:p>
@@ -1589,7 +1589,7 @@
           <a:p>
             <a:fld id="{C8F573ED-087B-AA4D-9B10-6AC522CA2519}" type="datetimeFigureOut">
               <a:rPr lang="en-US" smtClean="0"/>
-              <a:t>12/13/19</a:t>
+              <a:t>2/6/20</a:t>
             </a:fld>
             <a:endParaRPr lang="en-US"/>
           </a:p>
@@ -1854,7 +1854,7 @@
           <a:p>
             <a:fld id="{C8F573ED-087B-AA4D-9B10-6AC522CA2519}" type="datetimeFigureOut">
               <a:rPr lang="en-US" smtClean="0"/>
-              <a:t>12/13/19</a:t>
+              <a:t>2/6/20</a:t>
             </a:fld>
             <a:endParaRPr lang="en-US"/>
           </a:p>
@@ -2266,7 +2266,7 @@
           <a:p>
             <a:fld id="{C8F573ED-087B-AA4D-9B10-6AC522CA2519}" type="datetimeFigureOut">
               <a:rPr lang="en-US" smtClean="0"/>
-              <a:t>12/13/19</a:t>
+              <a:t>2/6/20</a:t>
             </a:fld>
             <a:endParaRPr lang="en-US"/>
           </a:p>
@@ -2407,7 +2407,7 @@
           <a:p>
             <a:fld id="{C8F573ED-087B-AA4D-9B10-6AC522CA2519}" type="datetimeFigureOut">
               <a:rPr lang="en-US" smtClean="0"/>
-              <a:t>12/13/19</a:t>
+              <a:t>2/6/20</a:t>
             </a:fld>
             <a:endParaRPr lang="en-US"/>
           </a:p>
@@ -2520,7 +2520,7 @@
           <a:p>
             <a:fld id="{C8F573ED-087B-AA4D-9B10-6AC522CA2519}" type="datetimeFigureOut">
               <a:rPr lang="en-US" smtClean="0"/>
-              <a:t>12/13/19</a:t>
+              <a:t>2/6/20</a:t>
             </a:fld>
             <a:endParaRPr lang="en-US"/>
           </a:p>
@@ -2831,7 +2831,7 @@
           <a:p>
             <a:fld id="{C8F573ED-087B-AA4D-9B10-6AC522CA2519}" type="datetimeFigureOut">
               <a:rPr lang="en-US" smtClean="0"/>
-              <a:t>12/13/19</a:t>
+              <a:t>2/6/20</a:t>
             </a:fld>
             <a:endParaRPr lang="en-US"/>
           </a:p>
@@ -3119,7 +3119,7 @@
           <a:p>
             <a:fld id="{C8F573ED-087B-AA4D-9B10-6AC522CA2519}" type="datetimeFigureOut">
               <a:rPr lang="en-US" smtClean="0"/>
-              <a:t>12/13/19</a:t>
+              <a:t>2/6/20</a:t>
             </a:fld>
             <a:endParaRPr lang="en-US"/>
           </a:p>
@@ -3360,7 +3360,7 @@
           <a:p>
             <a:fld id="{C8F573ED-087B-AA4D-9B10-6AC522CA2519}" type="datetimeFigureOut">
               <a:rPr lang="en-US" smtClean="0"/>
-              <a:t>12/13/19</a:t>
+              <a:t>2/6/20</a:t>
             </a:fld>
             <a:endParaRPr lang="en-US"/>
           </a:p>
@@ -5566,7 +5566,7 @@
                   </a:schemeClr>
                 </a:solidFill>
               </a:rPr>
-              <a:t>100 bivalves per foot</a:t>
+              <a:t>400 cm of bivalves per foot</a:t>
             </a:r>
           </a:p>
           <a:p>

</xml_diff>